<commit_message>
inclusão de slides sobre classes de teste
</commit_message>
<xml_diff>
--- a/unit-tests_visual-studio.pptx
+++ b/unit-tests_visual-studio.pptx
@@ -5,17 +5,15 @@
     <p:sldMasterId id="2147483648" r:id="rId1"/>
   </p:sldMasterIdLst>
   <p:notesMasterIdLst>
-    <p:notesMasterId r:id="rId10"/>
+    <p:notesMasterId r:id="rId8"/>
   </p:notesMasterIdLst>
   <p:sldIdLst>
     <p:sldId id="256" r:id="rId2"/>
     <p:sldId id="299" r:id="rId3"/>
     <p:sldId id="304" r:id="rId4"/>
     <p:sldId id="305" r:id="rId5"/>
-    <p:sldId id="301" r:id="rId6"/>
-    <p:sldId id="302" r:id="rId7"/>
-    <p:sldId id="303" r:id="rId8"/>
-    <p:sldId id="300" r:id="rId9"/>
+    <p:sldId id="306" r:id="rId6"/>
+    <p:sldId id="300" r:id="rId7"/>
   </p:sldIdLst>
   <p:sldSz cx="12192000" cy="6858000"/>
   <p:notesSz cx="6858000" cy="9144000"/>
@@ -204,7 +202,7 @@
           <a:p>
             <a:fld id="{94D3EB41-CF60-4C9F-BD83-AE56FA0945EB}" type="datetimeFigureOut">
               <a:rPr lang="pt-BR" smtClean="0"/>
-              <a:t>02/08/2019</a:t>
+              <a:t>03/08/2019</a:t>
             </a:fld>
             <a:endParaRPr lang="pt-BR"/>
           </a:p>
@@ -555,155 +553,6 @@
 </p:notes>
 </file>
 
-<file path=ppt/notesSlides/notesSlide2.xml><?xml version="1.0" encoding="utf-8"?>
-<p:notes xmlns:a="http://schemas.openxmlformats.org/drawingml/2006/main" xmlns:r="http://schemas.openxmlformats.org/officeDocument/2006/relationships" xmlns:p="http://schemas.openxmlformats.org/presentationml/2006/main">
-  <p:cSld>
-    <p:spTree>
-      <p:nvGrpSpPr>
-        <p:cNvPr id="1" name=""/>
-        <p:cNvGrpSpPr/>
-        <p:nvPr/>
-      </p:nvGrpSpPr>
-      <p:grpSpPr>
-        <a:xfrm>
-          <a:off x="0" y="0"/>
-          <a:ext cx="0" cy="0"/>
-          <a:chOff x="0" y="0"/>
-          <a:chExt cx="0" cy="0"/>
-        </a:xfrm>
-      </p:grpSpPr>
-      <p:sp>
-        <p:nvSpPr>
-          <p:cNvPr id="2" name="Espaço Reservado para Imagem de Slide 1"/>
-          <p:cNvSpPr>
-            <a:spLocks noGrp="1" noRot="1" noChangeAspect="1"/>
-          </p:cNvSpPr>
-          <p:nvPr>
-            <p:ph type="sldImg"/>
-          </p:nvPr>
-        </p:nvSpPr>
-        <p:spPr/>
-      </p:sp>
-      <p:sp>
-        <p:nvSpPr>
-          <p:cNvPr id="3" name="Espaço Reservado para Anotações 2"/>
-          <p:cNvSpPr>
-            <a:spLocks noGrp="1"/>
-          </p:cNvSpPr>
-          <p:nvPr>
-            <p:ph type="body" idx="1"/>
-          </p:nvPr>
-        </p:nvSpPr>
-        <p:spPr/>
-        <p:txBody>
-          <a:bodyPr/>
-          <a:lstStyle/>
-          <a:p>
-            <a:r>
-              <a:rPr lang="en-US" sz="1200" b="0" i="0" kern="1200" dirty="0" smtClean="0">
-                <a:solidFill>
-                  <a:schemeClr val="tx1"/>
-                </a:solidFill>
-                <a:effectLst/>
-                <a:latin typeface="+mn-lt"/>
-                <a:ea typeface="+mn-ea"/>
-                <a:cs typeface="+mn-cs"/>
-              </a:rPr>
-              <a:t>1 - These tests are compiled to run locally on the Java Virtual Machine (JVM) to minimize execution time.</a:t>
-            </a:r>
-          </a:p>
-          <a:p>
-            <a:r>
-              <a:rPr lang="en-US" sz="1200" b="0" i="0" kern="1200" dirty="0" smtClean="0">
-                <a:solidFill>
-                  <a:schemeClr val="tx1"/>
-                </a:solidFill>
-                <a:effectLst/>
-                <a:latin typeface="+mn-lt"/>
-                <a:ea typeface="+mn-ea"/>
-                <a:cs typeface="+mn-cs"/>
-              </a:rPr>
-              <a:t>Use this approach to run unit tests that have no dependencies on the Android framework or have dependencies that can be filled by using mock objects.</a:t>
-            </a:r>
-          </a:p>
-          <a:p>
-            <a:endParaRPr lang="en-US" sz="1200" b="0" i="0" kern="1200" dirty="0" smtClean="0">
-              <a:solidFill>
-                <a:schemeClr val="tx1"/>
-              </a:solidFill>
-              <a:effectLst/>
-              <a:latin typeface="+mn-lt"/>
-              <a:ea typeface="+mn-ea"/>
-              <a:cs typeface="+mn-cs"/>
-            </a:endParaRPr>
-          </a:p>
-          <a:p>
-            <a:r>
-              <a:rPr lang="en-US" sz="1200" b="0" i="0" kern="1200" dirty="0" smtClean="0">
-                <a:solidFill>
-                  <a:schemeClr val="tx1"/>
-                </a:solidFill>
-                <a:effectLst/>
-                <a:latin typeface="+mn-lt"/>
-                <a:ea typeface="+mn-ea"/>
-                <a:cs typeface="+mn-cs"/>
-              </a:rPr>
-              <a:t>2 - These tests have access to instrumentation information, such as the Context for the app under test.</a:t>
-            </a:r>
-          </a:p>
-          <a:p>
-            <a:r>
-              <a:rPr lang="en-US" sz="1200" b="0" i="0" kern="1200" dirty="0" smtClean="0">
-                <a:solidFill>
-                  <a:schemeClr val="tx1"/>
-                </a:solidFill>
-                <a:effectLst/>
-                <a:latin typeface="+mn-lt"/>
-                <a:ea typeface="+mn-ea"/>
-                <a:cs typeface="+mn-cs"/>
-              </a:rPr>
-              <a:t>Use this approach to run unit tests that have Android dependencies which cannot be easily filled by using mock objects.</a:t>
-            </a:r>
-            <a:endParaRPr lang="pt-BR" dirty="0"/>
-          </a:p>
-        </p:txBody>
-      </p:sp>
-      <p:sp>
-        <p:nvSpPr>
-          <p:cNvPr id="4" name="Espaço Reservado para Número de Slide 3"/>
-          <p:cNvSpPr>
-            <a:spLocks noGrp="1"/>
-          </p:cNvSpPr>
-          <p:nvPr>
-            <p:ph type="sldNum" sz="quarter" idx="10"/>
-          </p:nvPr>
-        </p:nvSpPr>
-        <p:spPr/>
-        <p:txBody>
-          <a:bodyPr/>
-          <a:lstStyle/>
-          <a:p>
-            <a:fld id="{020F486D-935E-4125-8FD7-C735663CC7DE}" type="slidenum">
-              <a:rPr lang="pt-BR" smtClean="0"/>
-              <a:t>5</a:t>
-            </a:fld>
-            <a:endParaRPr lang="pt-BR"/>
-          </a:p>
-        </p:txBody>
-      </p:sp>
-    </p:spTree>
-    <p:extLst>
-      <p:ext uri="{BB962C8B-B14F-4D97-AF65-F5344CB8AC3E}">
-        <p14:creationId xmlns:p14="http://schemas.microsoft.com/office/powerpoint/2010/main" val="2443168199"/>
-      </p:ext>
-    </p:extLst>
-  </p:cSld>
-  <p:clrMapOvr>
-    <a:masterClrMapping/>
-  </p:clrMapOvr>
-</p:notes>
-</file>
-
 <file path=ppt/slideLayouts/slideLayout1.xml><?xml version="1.0" encoding="utf-8"?>
 <p:sldLayout xmlns:a="http://schemas.openxmlformats.org/drawingml/2006/main" xmlns:r="http://schemas.openxmlformats.org/officeDocument/2006/relationships" xmlns:p="http://schemas.openxmlformats.org/presentationml/2006/main" type="title" preserve="1">
   <p:cSld name="Slide de título">
@@ -863,7 +712,7 @@
           <a:p>
             <a:fld id="{9642BF85-54FF-46CE-B398-87F998CFD60B}" type="datetimeFigureOut">
               <a:rPr lang="pt-BR" smtClean="0"/>
-              <a:t>02/08/2019</a:t>
+              <a:t>03/08/2019</a:t>
             </a:fld>
             <a:endParaRPr lang="pt-BR"/>
           </a:p>
@@ -1031,7 +880,7 @@
           <a:p>
             <a:fld id="{9642BF85-54FF-46CE-B398-87F998CFD60B}" type="datetimeFigureOut">
               <a:rPr lang="pt-BR" smtClean="0"/>
-              <a:t>02/08/2019</a:t>
+              <a:t>03/08/2019</a:t>
             </a:fld>
             <a:endParaRPr lang="pt-BR"/>
           </a:p>
@@ -1209,7 +1058,7 @@
           <a:p>
             <a:fld id="{9642BF85-54FF-46CE-B398-87F998CFD60B}" type="datetimeFigureOut">
               <a:rPr lang="pt-BR" smtClean="0"/>
-              <a:t>02/08/2019</a:t>
+              <a:t>03/08/2019</a:t>
             </a:fld>
             <a:endParaRPr lang="pt-BR"/>
           </a:p>
@@ -1546,7 +1395,7 @@
           <a:p>
             <a:fld id="{9642BF85-54FF-46CE-B398-87F998CFD60B}" type="datetimeFigureOut">
               <a:rPr lang="pt-BR" smtClean="0"/>
-              <a:t>02/08/2019</a:t>
+              <a:t>03/08/2019</a:t>
             </a:fld>
             <a:endParaRPr lang="pt-BR"/>
           </a:p>
@@ -1817,7 +1666,7 @@
           <a:p>
             <a:fld id="{9642BF85-54FF-46CE-B398-87F998CFD60B}" type="datetimeFigureOut">
               <a:rPr lang="pt-BR" smtClean="0"/>
-              <a:t>02/08/2019</a:t>
+              <a:t>03/08/2019</a:t>
             </a:fld>
             <a:endParaRPr lang="pt-BR"/>
           </a:p>
@@ -2063,7 +1912,7 @@
           <a:p>
             <a:fld id="{9642BF85-54FF-46CE-B398-87F998CFD60B}" type="datetimeFigureOut">
               <a:rPr lang="pt-BR" smtClean="0"/>
-              <a:t>02/08/2019</a:t>
+              <a:t>03/08/2019</a:t>
             </a:fld>
             <a:endParaRPr lang="pt-BR"/>
           </a:p>
@@ -2427,7 +2276,7 @@
           <a:p>
             <a:fld id="{9642BF85-54FF-46CE-B398-87F998CFD60B}" type="datetimeFigureOut">
               <a:rPr lang="pt-BR" smtClean="0"/>
-              <a:t>02/08/2019</a:t>
+              <a:t>03/08/2019</a:t>
             </a:fld>
             <a:endParaRPr lang="pt-BR"/>
           </a:p>
@@ -2561,7 +2410,7 @@
           <a:p>
             <a:fld id="{9642BF85-54FF-46CE-B398-87F998CFD60B}" type="datetimeFigureOut">
               <a:rPr lang="pt-BR" smtClean="0"/>
-              <a:t>02/08/2019</a:t>
+              <a:t>03/08/2019</a:t>
             </a:fld>
             <a:endParaRPr lang="pt-BR"/>
           </a:p>
@@ -2656,7 +2505,7 @@
           <a:p>
             <a:fld id="{9642BF85-54FF-46CE-B398-87F998CFD60B}" type="datetimeFigureOut">
               <a:rPr lang="pt-BR" smtClean="0"/>
-              <a:t>02/08/2019</a:t>
+              <a:t>03/08/2019</a:t>
             </a:fld>
             <a:endParaRPr lang="pt-BR"/>
           </a:p>
@@ -2931,7 +2780,7 @@
           <a:p>
             <a:fld id="{9642BF85-54FF-46CE-B398-87F998CFD60B}" type="datetimeFigureOut">
               <a:rPr lang="pt-BR" smtClean="0"/>
-              <a:t>02/08/2019</a:t>
+              <a:t>03/08/2019</a:t>
             </a:fld>
             <a:endParaRPr lang="pt-BR"/>
           </a:p>
@@ -3183,7 +3032,7 @@
           <a:p>
             <a:fld id="{9642BF85-54FF-46CE-B398-87F998CFD60B}" type="datetimeFigureOut">
               <a:rPr lang="pt-BR" smtClean="0"/>
-              <a:t>02/08/2019</a:t>
+              <a:t>03/08/2019</a:t>
             </a:fld>
             <a:endParaRPr lang="pt-BR"/>
           </a:p>
@@ -3403,7 +3252,7 @@
           <a:p>
             <a:fld id="{9642BF85-54FF-46CE-B398-87F998CFD60B}" type="datetimeFigureOut">
               <a:rPr lang="pt-BR" smtClean="0"/>
-              <a:t>02/08/2019</a:t>
+              <a:t>03/08/2019</a:t>
             </a:fld>
             <a:endParaRPr lang="pt-BR"/>
           </a:p>
@@ -4189,7 +4038,7 @@
           <a:p>
             <a:r>
               <a:rPr lang="pt-BR" dirty="0" smtClean="0"/>
-              <a:t>Teste Unitário</a:t>
+              <a:t>Requisitos de um Método de Teste</a:t>
             </a:r>
             <a:endParaRPr lang="pt-BR" dirty="0"/>
           </a:p>
@@ -4212,91 +4061,64 @@
           </a:bodyPr>
           <a:lstStyle/>
           <a:p>
+            <a:pPr algn="l"/>
             <a:r>
               <a:rPr lang="pt-BR" dirty="0" smtClean="0"/>
-              <a:t>Os</a:t>
-            </a:r>
-            <a:r>
-              <a:rPr lang="en-US" dirty="0" smtClean="0"/>
-              <a:t> testes </a:t>
-            </a:r>
+              <a:t>Um método de teste deve atender aos seguintes requisitos:</a:t>
+            </a:r>
+          </a:p>
+          <a:p>
+            <a:pPr marL="457200" indent="-457200" algn="l">
+              <a:buFont typeface="Arial" panose="020B0604020202020204" pitchFamily="34" charset="0"/>
+              <a:buChar char="•"/>
+            </a:pPr>
             <a:r>
               <a:rPr lang="pt-BR" dirty="0" smtClean="0"/>
-              <a:t>unitários</a:t>
-            </a:r>
-            <a:r>
-              <a:rPr lang="en-US" dirty="0" smtClean="0"/>
-              <a:t> </a:t>
+              <a:t>Estar anotado com o atributo </a:t>
+            </a:r>
+            <a:r>
+              <a:rPr lang="pt-BR" b="1" i="1" dirty="0" smtClean="0"/>
+              <a:t>[</a:t>
+            </a:r>
+            <a:r>
+              <a:rPr lang="pt-BR" b="1" i="1" dirty="0" err="1" smtClean="0"/>
+              <a:t>TestMethod</a:t>
+            </a:r>
+            <a:r>
+              <a:rPr lang="pt-BR" b="1" i="1" dirty="0" smtClean="0"/>
+              <a:t>]</a:t>
             </a:r>
             <a:r>
               <a:rPr lang="pt-BR" dirty="0" smtClean="0"/>
-              <a:t>geralmente</a:t>
-            </a:r>
-            <a:r>
-              <a:rPr lang="en-US" dirty="0" smtClean="0"/>
-              <a:t> </a:t>
-            </a:r>
+              <a:t>;</a:t>
+            </a:r>
+          </a:p>
+          <a:p>
+            <a:pPr marL="457200" indent="-457200" algn="l">
+              <a:buFont typeface="Arial" panose="020B0604020202020204" pitchFamily="34" charset="0"/>
+              <a:buChar char="•"/>
+            </a:pPr>
             <a:r>
               <a:rPr lang="pt-BR" dirty="0" smtClean="0"/>
-              <a:t>exercitam</a:t>
-            </a:r>
-            <a:r>
-              <a:rPr lang="en-US" dirty="0" smtClean="0"/>
-              <a:t> as </a:t>
+              <a:t>Retornar </a:t>
+            </a:r>
+            <a:r>
+              <a:rPr lang="pt-BR" dirty="0" err="1" smtClean="0"/>
+              <a:t>void</a:t>
             </a:r>
             <a:r>
               <a:rPr lang="pt-BR" dirty="0" smtClean="0"/>
-              <a:t>funcionalidades</a:t>
-            </a:r>
-            <a:r>
-              <a:rPr lang="en-US" dirty="0" smtClean="0"/>
-              <a:t> das </a:t>
-            </a:r>
+              <a:t>; e</a:t>
+            </a:r>
+          </a:p>
+          <a:p>
+            <a:pPr marL="457200" indent="-457200" algn="l">
+              <a:buFont typeface="Arial" panose="020B0604020202020204" pitchFamily="34" charset="0"/>
+              <a:buChar char="•"/>
+            </a:pPr>
             <a:r>
               <a:rPr lang="pt-BR" dirty="0" smtClean="0"/>
-              <a:t>menores</a:t>
-            </a:r>
-            <a:r>
-              <a:rPr lang="en-US" dirty="0" smtClean="0"/>
-              <a:t> </a:t>
-            </a:r>
-            <a:r>
-              <a:rPr lang="pt-BR" dirty="0" smtClean="0"/>
-              <a:t>unidades</a:t>
-            </a:r>
-            <a:r>
-              <a:rPr lang="en-US" dirty="0" smtClean="0"/>
-              <a:t> de </a:t>
-            </a:r>
-            <a:r>
-              <a:rPr lang="pt-BR" dirty="0" smtClean="0"/>
-              <a:t>código que se podem ser testadas (como métodos, classes ou</a:t>
-            </a:r>
-            <a:r>
-              <a:rPr lang="en-US" dirty="0" smtClean="0"/>
-              <a:t> </a:t>
-            </a:r>
-            <a:r>
-              <a:rPr lang="pt-BR" dirty="0" smtClean="0"/>
-              <a:t>componentes</a:t>
-            </a:r>
-            <a:r>
-              <a:rPr lang="en-US" dirty="0" smtClean="0"/>
-              <a:t>) de forma </a:t>
-            </a:r>
-            <a:r>
-              <a:rPr lang="pt-BR" dirty="0" smtClean="0"/>
-              <a:t>repetitiva</a:t>
-            </a:r>
-            <a:r>
-              <a:rPr lang="en-US" dirty="0" smtClean="0"/>
-              <a:t>.</a:t>
-            </a:r>
-          </a:p>
-          <a:p>
-            <a:r>
-              <a:rPr lang="pt-BR" dirty="0" smtClean="0"/>
-              <a:t>Você deve criar testes unitários quando precisar verificar a lógica de código específico em seu aplicativo.</a:t>
+              <a:t>Não ter parâmetros.</a:t>
             </a:r>
             <a:endParaRPr lang="pt-BR" dirty="0"/>
           </a:p>
@@ -4344,82 +4166,96 @@
         </p:nvSpPr>
         <p:spPr/>
         <p:txBody>
-          <a:bodyPr/>
-          <a:lstStyle/>
-          <a:p>
-            <a:r>
-              <a:rPr lang="pt-BR" dirty="0" smtClean="0"/>
-              <a:t>Testando aplicativos </a:t>
-            </a:r>
-            <a:r>
-              <a:rPr lang="pt-BR" dirty="0" err="1"/>
-              <a:t>a</a:t>
-            </a:r>
-            <a:r>
-              <a:rPr lang="pt-BR" dirty="0" err="1" smtClean="0"/>
-              <a:t>ndroid</a:t>
-            </a:r>
-            <a:endParaRPr lang="pt-BR" dirty="0"/>
-          </a:p>
-        </p:txBody>
-      </p:sp>
-      <p:sp>
-        <p:nvSpPr>
-          <p:cNvPr id="6" name="Espaço Reservado para Conteúdo 5"/>
-          <p:cNvSpPr>
-            <a:spLocks noGrp="1"/>
-          </p:cNvSpPr>
-          <p:nvPr>
-            <p:ph idx="1"/>
-          </p:nvPr>
-        </p:nvSpPr>
-        <p:spPr/>
-        <p:txBody>
           <a:bodyPr>
             <a:normAutofit/>
           </a:bodyPr>
           <a:lstStyle/>
           <a:p>
-            <a:pPr algn="l"/>
             <a:r>
               <a:rPr lang="pt-BR" dirty="0" smtClean="0"/>
-              <a:t>Tipos de testes unitários para aplicativos </a:t>
+              <a:t>Classe </a:t>
             </a:r>
             <a:r>
               <a:rPr lang="pt-BR" dirty="0" err="1" smtClean="0"/>
-              <a:t>android</a:t>
-            </a:r>
+              <a:t>Assert</a:t>
+            </a:r>
+            <a:endParaRPr lang="pt-BR" dirty="0"/>
+          </a:p>
+        </p:txBody>
+      </p:sp>
+      <p:sp>
+        <p:nvSpPr>
+          <p:cNvPr id="6" name="Espaço Reservado para Conteúdo 5"/>
+          <p:cNvSpPr>
+            <a:spLocks noGrp="1"/>
+          </p:cNvSpPr>
+          <p:nvPr>
+            <p:ph idx="1"/>
+          </p:nvPr>
+        </p:nvSpPr>
+        <p:spPr/>
+        <p:txBody>
+          <a:bodyPr>
+            <a:normAutofit/>
+          </a:bodyPr>
+          <a:lstStyle/>
+          <a:p>
             <a:r>
               <a:rPr lang="pt-BR" dirty="0" smtClean="0"/>
-              <a:t>:</a:t>
-            </a:r>
-          </a:p>
-          <a:p>
-            <a:pPr marL="457200" indent="-457200" algn="l">
-              <a:buFont typeface="Arial" panose="020B0604020202020204" pitchFamily="34" charset="0"/>
-              <a:buChar char="•"/>
-            </a:pPr>
+              <a:t>É uma coleção de classes utilitárias para testar várias condições em testes unitários. Se a condição que estiver sendo testada não for atendida, uma exceção é lançada.</a:t>
+            </a:r>
+          </a:p>
+          <a:p>
+            <a:r>
+              <a:rPr lang="pt-BR" b="1" i="1" dirty="0" err="1"/>
+              <a:t>public</a:t>
+            </a:r>
+            <a:r>
+              <a:rPr lang="pt-BR" b="1" i="1" dirty="0"/>
+              <a:t> </a:t>
+            </a:r>
+            <a:r>
+              <a:rPr lang="pt-BR" b="1" i="1" dirty="0" err="1"/>
+              <a:t>sealed</a:t>
+            </a:r>
+            <a:r>
+              <a:rPr lang="pt-BR" b="1" i="1" dirty="0"/>
+              <a:t> </a:t>
+            </a:r>
+            <a:r>
+              <a:rPr lang="pt-BR" b="1" i="1" dirty="0" err="1"/>
+              <a:t>class</a:t>
+            </a:r>
+            <a:r>
+              <a:rPr lang="pt-BR" b="1" i="1" dirty="0"/>
+              <a:t> </a:t>
+            </a:r>
+            <a:r>
+              <a:rPr lang="pt-BR" b="1" i="1" dirty="0" err="1" smtClean="0"/>
+              <a:t>Assert</a:t>
+            </a:r>
+            <a:endParaRPr lang="pt-BR" b="1" i="1" dirty="0" smtClean="0"/>
+          </a:p>
+          <a:p>
             <a:r>
               <a:rPr lang="pt-BR" dirty="0" smtClean="0"/>
-              <a:t>Testes locais: testes unitários que são executados apenas na máquina local; e</a:t>
-            </a:r>
-          </a:p>
-          <a:p>
-            <a:pPr marL="457200" indent="-457200" algn="l">
-              <a:buFont typeface="Arial" panose="020B0604020202020204" pitchFamily="34" charset="0"/>
-              <a:buChar char="•"/>
-            </a:pPr>
+              <a:t>O modificador </a:t>
+            </a:r>
+            <a:r>
+              <a:rPr lang="pt-BR" dirty="0" err="1" smtClean="0"/>
+              <a:t>sealed</a:t>
+            </a:r>
             <a:r>
               <a:rPr lang="pt-BR" dirty="0" smtClean="0"/>
-              <a:t>Testes instrumentados: testes unitários que são executados em um dispositivo </a:t>
+              <a:t> impede que outras classes herdem da classe </a:t>
             </a:r>
             <a:r>
               <a:rPr lang="pt-BR" dirty="0" err="1" smtClean="0"/>
-              <a:t>android</a:t>
+              <a:t>Assert</a:t>
             </a:r>
             <a:r>
               <a:rPr lang="pt-BR" dirty="0" smtClean="0"/>
-              <a:t> ou emulador.</a:t>
+              <a:t>.</a:t>
             </a:r>
             <a:endParaRPr lang="pt-BR" dirty="0"/>
           </a:p>
@@ -4428,7 +4264,7 @@
     </p:spTree>
     <p:extLst>
       <p:ext uri="{BB962C8B-B14F-4D97-AF65-F5344CB8AC3E}">
-        <p14:creationId xmlns:p14="http://schemas.microsoft.com/office/powerpoint/2010/main" val="2446503545"/>
+        <p14:creationId xmlns:p14="http://schemas.microsoft.com/office/powerpoint/2010/main" val="943574800"/>
       </p:ext>
     </p:extLst>
   </p:cSld>
@@ -4457,196 +4293,6 @@
       </p:grpSpPr>
       <p:sp>
         <p:nvSpPr>
-          <p:cNvPr id="2" name="Título 1"/>
-          <p:cNvSpPr>
-            <a:spLocks noGrp="1"/>
-          </p:cNvSpPr>
-          <p:nvPr>
-            <p:ph type="title"/>
-          </p:nvPr>
-        </p:nvSpPr>
-        <p:spPr/>
-        <p:txBody>
-          <a:bodyPr/>
-          <a:lstStyle/>
-          <a:p>
-            <a:r>
-              <a:rPr lang="pt-BR" dirty="0" smtClean="0"/>
-              <a:t>Testes unitários locais</a:t>
-            </a:r>
-            <a:endParaRPr lang="pt-BR" dirty="0"/>
-          </a:p>
-        </p:txBody>
-      </p:sp>
-      <p:sp>
-        <p:nvSpPr>
-          <p:cNvPr id="3" name="Espaço Reservado para Conteúdo 2"/>
-          <p:cNvSpPr>
-            <a:spLocks noGrp="1"/>
-          </p:cNvSpPr>
-          <p:nvPr>
-            <p:ph idx="1"/>
-          </p:nvPr>
-        </p:nvSpPr>
-        <p:spPr/>
-        <p:txBody>
-          <a:bodyPr>
-            <a:normAutofit lnSpcReduction="10000"/>
-          </a:bodyPr>
-          <a:lstStyle/>
-          <a:p>
-            <a:r>
-              <a:rPr lang="pt-BR" dirty="0" smtClean="0"/>
-              <a:t>Se seu teste unitário não possui dependências ou possui apenas dependências simples no </a:t>
-            </a:r>
-            <a:r>
-              <a:rPr lang="pt-BR" dirty="0" err="1" smtClean="0"/>
-              <a:t>android</a:t>
-            </a:r>
-            <a:r>
-              <a:rPr lang="pt-BR" dirty="0" smtClean="0"/>
-              <a:t>, você deve executar seu teste na máquina local de desenvolvimento.</a:t>
-            </a:r>
-          </a:p>
-          <a:p>
-            <a:r>
-              <a:rPr lang="pt-BR" dirty="0" smtClean="0"/>
-              <a:t>Essa abordagem de teste evitar a sobrecarga de dados do aplicativo testado e do código do teste unitário no dispositivo físico (ou emulador) toda vez que o teste for executado.</a:t>
-            </a:r>
-          </a:p>
-          <a:p>
-            <a:r>
-              <a:rPr lang="pt-BR" dirty="0" smtClean="0"/>
-              <a:t>Consequentemente, o tempo de execução dos testes é drasticamente reduzido.</a:t>
-            </a:r>
-            <a:endParaRPr lang="pt-BR" dirty="0"/>
-          </a:p>
-        </p:txBody>
-      </p:sp>
-    </p:spTree>
-    <p:extLst>
-      <p:ext uri="{BB962C8B-B14F-4D97-AF65-F5344CB8AC3E}">
-        <p14:creationId xmlns:p14="http://schemas.microsoft.com/office/powerpoint/2010/main" val="1771955523"/>
-      </p:ext>
-    </p:extLst>
-  </p:cSld>
-  <p:clrMapOvr>
-    <a:masterClrMapping/>
-  </p:clrMapOvr>
-</p:sld>
-</file>
-
-<file path=ppt/slides/slide7.xml><?xml version="1.0" encoding="utf-8"?>
-<p:sld xmlns:a="http://schemas.openxmlformats.org/drawingml/2006/main" xmlns:r="http://schemas.openxmlformats.org/officeDocument/2006/relationships" xmlns:p="http://schemas.openxmlformats.org/presentationml/2006/main">
-  <p:cSld>
-    <p:spTree>
-      <p:nvGrpSpPr>
-        <p:cNvPr id="1" name=""/>
-        <p:cNvGrpSpPr/>
-        <p:nvPr/>
-      </p:nvGrpSpPr>
-      <p:grpSpPr>
-        <a:xfrm>
-          <a:off x="0" y="0"/>
-          <a:ext cx="0" cy="0"/>
-          <a:chOff x="0" y="0"/>
-          <a:chExt cx="0" cy="0"/>
-        </a:xfrm>
-      </p:grpSpPr>
-      <p:sp>
-        <p:nvSpPr>
-          <p:cNvPr id="2" name="Título 1"/>
-          <p:cNvSpPr>
-            <a:spLocks noGrp="1"/>
-          </p:cNvSpPr>
-          <p:nvPr>
-            <p:ph type="title"/>
-          </p:nvPr>
-        </p:nvSpPr>
-        <p:spPr/>
-        <p:txBody>
-          <a:bodyPr/>
-          <a:lstStyle/>
-          <a:p>
-            <a:r>
-              <a:rPr lang="pt-BR" dirty="0" err="1" smtClean="0"/>
-              <a:t>Junit</a:t>
-            </a:r>
-            <a:r>
-              <a:rPr lang="pt-BR" dirty="0" smtClean="0"/>
-              <a:t> 4</a:t>
-            </a:r>
-            <a:endParaRPr lang="pt-BR" dirty="0"/>
-          </a:p>
-        </p:txBody>
-      </p:sp>
-      <p:sp>
-        <p:nvSpPr>
-          <p:cNvPr id="3" name="Espaço Reservado para Conteúdo 2"/>
-          <p:cNvSpPr>
-            <a:spLocks noGrp="1"/>
-          </p:cNvSpPr>
-          <p:nvPr>
-            <p:ph idx="1"/>
-          </p:nvPr>
-        </p:nvSpPr>
-        <p:spPr/>
-        <p:txBody>
-          <a:bodyPr/>
-          <a:lstStyle/>
-          <a:p>
-            <a:r>
-              <a:rPr lang="pt-BR" dirty="0" err="1" smtClean="0"/>
-              <a:t>Junit</a:t>
-            </a:r>
-            <a:r>
-              <a:rPr lang="pt-BR" dirty="0" smtClean="0"/>
-              <a:t> é um framework simples para escrever testes repetitivos. Trata-se de uma instância da arquitetura </a:t>
-            </a:r>
-            <a:r>
-              <a:rPr lang="pt-BR" dirty="0" err="1" smtClean="0"/>
-              <a:t>xUnit</a:t>
-            </a:r>
-            <a:r>
-              <a:rPr lang="pt-BR" dirty="0" smtClean="0"/>
-              <a:t> para frameworks de teste unitário.</a:t>
-            </a:r>
-            <a:endParaRPr lang="pt-BR" dirty="0"/>
-          </a:p>
-        </p:txBody>
-      </p:sp>
-    </p:spTree>
-    <p:extLst>
-      <p:ext uri="{BB962C8B-B14F-4D97-AF65-F5344CB8AC3E}">
-        <p14:creationId xmlns:p14="http://schemas.microsoft.com/office/powerpoint/2010/main" val="951264095"/>
-      </p:ext>
-    </p:extLst>
-  </p:cSld>
-  <p:clrMapOvr>
-    <a:masterClrMapping/>
-  </p:clrMapOvr>
-</p:sld>
-</file>
-
-<file path=ppt/slides/slide8.xml><?xml version="1.0" encoding="utf-8"?>
-<p:sld xmlns:a="http://schemas.openxmlformats.org/drawingml/2006/main" xmlns:r="http://schemas.openxmlformats.org/officeDocument/2006/relationships" xmlns:p="http://schemas.openxmlformats.org/presentationml/2006/main">
-  <p:cSld>
-    <p:spTree>
-      <p:nvGrpSpPr>
-        <p:cNvPr id="1" name=""/>
-        <p:cNvGrpSpPr/>
-        <p:nvPr/>
-      </p:nvGrpSpPr>
-      <p:grpSpPr>
-        <a:xfrm>
-          <a:off x="0" y="0"/>
-          <a:ext cx="0" cy="0"/>
-          <a:chOff x="0" y="0"/>
-          <a:chExt cx="0" cy="0"/>
-        </a:xfrm>
-      </p:grpSpPr>
-      <p:sp>
-        <p:nvSpPr>
           <p:cNvPr id="5" name="Título 4"/>
           <p:cNvSpPr>
             <a:spLocks noGrp="1"/>
@@ -4680,7 +4326,7 @@
         <p:spPr/>
         <p:txBody>
           <a:bodyPr>
-            <a:normAutofit lnSpcReduction="10000"/>
+            <a:normAutofit fontScale="62500" lnSpcReduction="20000"/>
           </a:bodyPr>
           <a:lstStyle/>
           <a:p>
@@ -4689,10 +4335,36 @@
               <a:buAutoNum type="arabicPeriod"/>
             </a:pPr>
             <a:r>
+              <a:rPr lang="pt-BR" dirty="0"/>
+              <a:t>Microsoft. </a:t>
+            </a:r>
+            <a:r>
+              <a:rPr lang="pt-BR" b="1" dirty="0"/>
+              <a:t>Passo a passo: Criar e executar testes de unidade para código </a:t>
+            </a:r>
+            <a:r>
+              <a:rPr lang="pt-BR" b="1" dirty="0" smtClean="0"/>
+              <a:t>gerenciado</a:t>
+            </a:r>
+            <a:r>
+              <a:rPr lang="pt-BR" dirty="0" smtClean="0"/>
+              <a:t>. Documentos do Visual Studio. Disponível em: </a:t>
+            </a:r>
+            <a:r>
               <a:rPr lang="pt-BR" dirty="0">
                 <a:hlinkClick r:id="rId2"/>
               </a:rPr>
-              <a:t>https://docs.microsoft.com/en-us/visualstudio/test/getting-started-with-unit-testing?view=vs-2019</a:t>
+              <a:t>https://</a:t>
+            </a:r>
+            <a:r>
+              <a:rPr lang="pt-BR" dirty="0" smtClean="0">
+                <a:hlinkClick r:id="rId2"/>
+              </a:rPr>
+              <a:t>docs.microsoft.com/pt-br/visualstudio/test/walkthrough-creating-and-running-unit-tests-for-managed-code?view=vs-2019</a:t>
+            </a:r>
+            <a:r>
+              <a:rPr lang="pt-BR" dirty="0" smtClean="0"/>
+              <a:t>.</a:t>
             </a:r>
             <a:endParaRPr lang="pt-BR" dirty="0" smtClean="0"/>
           </a:p>
@@ -4703,45 +4375,26 @@
             </a:pPr>
             <a:r>
               <a:rPr lang="pt-BR" dirty="0" smtClean="0"/>
-              <a:t>Microsoft</a:t>
-            </a:r>
-            <a:r>
-              <a:rPr lang="pt-BR" dirty="0"/>
-              <a:t>. </a:t>
-            </a:r>
-            <a:r>
-              <a:rPr lang="pt-BR" b="1" dirty="0"/>
-              <a:t>Noções básicas de teste de </a:t>
-            </a:r>
-            <a:r>
-              <a:rPr lang="pt-BR" b="1" dirty="0" smtClean="0"/>
-              <a:t>unidade</a:t>
+              <a:t>Microsoft. </a:t>
+            </a:r>
+            <a:r>
+              <a:rPr lang="en-US" b="1" dirty="0"/>
+              <a:t>Get started with unit testing</a:t>
             </a:r>
             <a:r>
               <a:rPr lang="pt-BR" dirty="0" smtClean="0"/>
-              <a:t>. </a:t>
-            </a:r>
-            <a:r>
-              <a:rPr lang="pt-BR" u="sng" dirty="0" smtClean="0"/>
-              <a:t>Disponível</a:t>
-            </a:r>
-            <a:r>
-              <a:rPr lang="pt-BR" dirty="0" smtClean="0"/>
-              <a:t> em: </a:t>
-            </a:r>
-            <a:r>
-              <a:rPr lang="pt-BR" dirty="0">
-                <a:hlinkClick r:id="rId3"/>
-              </a:rPr>
-              <a:t>https://</a:t>
+              <a:t>. Visual Studio Docs. Disponível em: </a:t>
             </a:r>
             <a:r>
               <a:rPr lang="pt-BR" dirty="0" smtClean="0">
                 <a:hlinkClick r:id="rId3"/>
               </a:rPr>
-              <a:t>docs.microsoft.com/pt-br/visualstudio/test/unit-test-basics?view=vs-2019</a:t>
-            </a:r>
-            <a:endParaRPr lang="pt-BR" dirty="0" smtClean="0"/>
+              <a:t>https://docs.microsoft.com/en-us/visualstudio/test/getting-started-with-unit-testing?view=vs-2019</a:t>
+            </a:r>
+            <a:r>
+              <a:rPr lang="pt-BR" dirty="0" smtClean="0"/>
+              <a:t>.</a:t>
+            </a:r>
           </a:p>
           <a:p>
             <a:pPr marL="514350" indent="-514350" algn="l">
@@ -4749,32 +4402,20 @@
               <a:buAutoNum type="arabicPeriod"/>
             </a:pPr>
             <a:r>
+              <a:rPr lang="pt-BR" dirty="0" smtClean="0"/>
+              <a:t>Microsoft</a:t>
+            </a:r>
+            <a:r>
               <a:rPr lang="pt-BR" dirty="0"/>
-              <a:t>Microsoft. </a:t>
+              <a:t>. </a:t>
             </a:r>
             <a:r>
               <a:rPr lang="pt-BR" b="1" dirty="0"/>
-              <a:t>Unit </a:t>
-            </a:r>
-            <a:r>
-              <a:rPr lang="pt-BR" b="1" dirty="0" err="1"/>
-              <a:t>test</a:t>
-            </a:r>
-            <a:r>
-              <a:rPr lang="pt-BR" b="1" dirty="0"/>
-              <a:t> </a:t>
-            </a:r>
-            <a:r>
-              <a:rPr lang="pt-BR" b="1" dirty="0" err="1"/>
-              <a:t>your</a:t>
-            </a:r>
-            <a:r>
-              <a:rPr lang="pt-BR" b="1" dirty="0"/>
-              <a:t> </a:t>
-            </a:r>
-            <a:r>
-              <a:rPr lang="pt-BR" b="1" dirty="0" err="1" smtClean="0"/>
-              <a:t>code</a:t>
+              <a:t>Noções básicas de teste de </a:t>
+            </a:r>
+            <a:r>
+              <a:rPr lang="pt-BR" b="1" dirty="0" smtClean="0"/>
+              <a:t>unidade</a:t>
             </a:r>
             <a:r>
               <a:rPr lang="pt-BR" dirty="0" smtClean="0"/>
@@ -4782,7 +4423,19 @@
             </a:r>
             <a:r>
               <a:rPr lang="pt-BR" dirty="0"/>
-              <a:t>Disponível em: </a:t>
+              <a:t>Documentos do Visual </a:t>
+            </a:r>
+            <a:r>
+              <a:rPr lang="pt-BR" dirty="0" smtClean="0"/>
+              <a:t>Studio. </a:t>
+            </a:r>
+            <a:r>
+              <a:rPr lang="pt-BR" dirty="0"/>
+              <a:t>Disponível </a:t>
+            </a:r>
+            <a:r>
+              <a:rPr lang="pt-BR" dirty="0" smtClean="0"/>
+              <a:t>em: </a:t>
             </a:r>
             <a:r>
               <a:rPr lang="pt-BR" dirty="0">
@@ -4794,8 +4447,121 @@
               <a:rPr lang="pt-BR" dirty="0" smtClean="0">
                 <a:hlinkClick r:id="rId4"/>
               </a:rPr>
+              <a:t>docs.microsoft.com/pt-br/visualstudio/test/unit-test-basics?view=vs-2019</a:t>
+            </a:r>
+            <a:r>
+              <a:rPr lang="pt-BR" dirty="0" smtClean="0"/>
+              <a:t>.</a:t>
+            </a:r>
+            <a:endParaRPr lang="pt-BR" dirty="0" smtClean="0"/>
+          </a:p>
+          <a:p>
+            <a:pPr marL="514350" indent="-514350" algn="l">
+              <a:buFont typeface="+mj-lt"/>
+              <a:buAutoNum type="arabicPeriod"/>
+            </a:pPr>
+            <a:r>
+              <a:rPr lang="pt-BR" dirty="0"/>
+              <a:t>Microsoft. </a:t>
+            </a:r>
+            <a:r>
+              <a:rPr lang="pt-BR" b="1" dirty="0"/>
+              <a:t>Unit </a:t>
+            </a:r>
+            <a:r>
+              <a:rPr lang="pt-BR" b="1" dirty="0" err="1"/>
+              <a:t>test</a:t>
+            </a:r>
+            <a:r>
+              <a:rPr lang="pt-BR" b="1" dirty="0"/>
+              <a:t> </a:t>
+            </a:r>
+            <a:r>
+              <a:rPr lang="pt-BR" b="1" dirty="0" err="1"/>
+              <a:t>your</a:t>
+            </a:r>
+            <a:r>
+              <a:rPr lang="pt-BR" b="1" dirty="0"/>
+              <a:t> </a:t>
+            </a:r>
+            <a:r>
+              <a:rPr lang="pt-BR" b="1" dirty="0" err="1" smtClean="0"/>
+              <a:t>code</a:t>
+            </a:r>
+            <a:r>
+              <a:rPr lang="pt-BR" dirty="0" smtClean="0"/>
+              <a:t>. </a:t>
+            </a:r>
+            <a:r>
+              <a:rPr lang="pt-BR" dirty="0"/>
+              <a:t>Visual Studio </a:t>
+            </a:r>
+            <a:r>
+              <a:rPr lang="pt-BR" dirty="0" smtClean="0"/>
+              <a:t>Docs. </a:t>
+            </a:r>
+            <a:r>
+              <a:rPr lang="pt-BR" dirty="0"/>
+              <a:t>Disponível </a:t>
+            </a:r>
+            <a:r>
+              <a:rPr lang="pt-BR" dirty="0"/>
+              <a:t>em: </a:t>
+            </a:r>
+            <a:r>
+              <a:rPr lang="pt-BR" dirty="0">
+                <a:hlinkClick r:id="rId5"/>
+              </a:rPr>
+              <a:t>https://</a:t>
+            </a:r>
+            <a:r>
+              <a:rPr lang="pt-BR" dirty="0" smtClean="0">
+                <a:hlinkClick r:id="rId5"/>
+              </a:rPr>
               <a:t>docs.microsoft.com/en-us/visualstudio/test/unit-test-your-code?view=vs-2019</a:t>
             </a:r>
+            <a:r>
+              <a:rPr lang="pt-BR" dirty="0" smtClean="0"/>
+              <a:t>.</a:t>
+            </a:r>
+          </a:p>
+          <a:p>
+            <a:pPr marL="514350" indent="-514350" algn="l">
+              <a:buFont typeface="+mj-lt"/>
+              <a:buAutoNum type="arabicPeriod"/>
+            </a:pPr>
+            <a:r>
+              <a:rPr lang="pt-BR" dirty="0" smtClean="0"/>
+              <a:t>Microsoft. </a:t>
+            </a:r>
+            <a:r>
+              <a:rPr lang="pt-BR" b="1" dirty="0" err="1" smtClean="0"/>
+              <a:t>Assert</a:t>
+            </a:r>
+            <a:r>
+              <a:rPr lang="pt-BR" b="1" dirty="0" smtClean="0"/>
+              <a:t> Class</a:t>
+            </a:r>
+            <a:r>
+              <a:rPr lang="pt-BR" dirty="0" smtClean="0"/>
+              <a:t>. Docs. Disponível em: </a:t>
+            </a:r>
+            <a:r>
+              <a:rPr lang="pt-BR" dirty="0">
+                <a:hlinkClick r:id="rId6"/>
+              </a:rPr>
+              <a:t>https://</a:t>
+            </a:r>
+            <a:r>
+              <a:rPr lang="pt-BR" dirty="0" smtClean="0">
+                <a:hlinkClick r:id="rId6"/>
+              </a:rPr>
+              <a:t>docs.microsoft.com/en-us/dotnet/api/microsoft.visualstudio.testtools.unittesting.assert?view=mstest-net-1.2.0</a:t>
+            </a:r>
+            <a:endParaRPr lang="pt-BR" dirty="0" smtClean="0"/>
+          </a:p>
+          <a:p>
+            <a:pPr algn="l"/>
             <a:endParaRPr lang="pt-BR" dirty="0" smtClean="0"/>
           </a:p>
           <a:p>

</xml_diff>